<commit_message>
Template change and content polishing
</commit_message>
<xml_diff>
--- a/01 into+appcustomizer.pptx
+++ b/01 into+appcustomizer.pptx
@@ -17,7 +17,7 @@
     <p:sldId id="1549" r:id="rId6"/>
     <p:sldId id="1550" r:id="rId7"/>
     <p:sldId id="1551" r:id="rId8"/>
-    <p:sldId id="1547" r:id="rId9"/>
+    <p:sldId id="1581" r:id="rId9"/>
     <p:sldId id="1552" r:id="rId10"/>
     <p:sldId id="1553" r:id="rId11"/>
     <p:sldId id="1554" r:id="rId12"/>
@@ -138,16 +138,16 @@
             <p14:sldId id="263"/>
           </p14:sldIdLst>
         </p14:section>
-        <p14:section name="extensions intro" id="{3A7429EF-79F1-A44F-B2E7-33EA665B892A}">
+        <p14:section name="extensions intro" id="{7AD6C352-0A45-444E-B8F9-8D2038BF74CA}">
           <p14:sldIdLst>
             <p14:sldId id="1548"/>
             <p14:sldId id="1549"/>
             <p14:sldId id="1550"/>
             <p14:sldId id="1551"/>
-            <p14:sldId id="1547"/>
+            <p14:sldId id="1581"/>
           </p14:sldIdLst>
         </p14:section>
-        <p14:section name="testing" id="{93F69F9F-77AE-7843-8802-6B2271D20D68}">
+        <p14:section name="testing" id="{8E3AA920-E048-4638-9677-E7ABDDCA76E7}">
           <p14:sldIdLst>
             <p14:sldId id="1552"/>
             <p14:sldId id="1553"/>
@@ -156,7 +156,7 @@
             <p14:sldId id="1555"/>
           </p14:sldIdLst>
         </p14:section>
-        <p14:section name="app-customizer" id="{AD5E57B6-2068-5741-9BA7-C978293D5CD3}">
+        <p14:section name="app-customizer" id="{2BECC8A6-E6AF-4813-8A56-4DE0B6DE0391}">
           <p14:sldIdLst>
             <p14:sldId id="1557"/>
             <p14:sldId id="1558"/>
@@ -164,7 +164,7 @@
             <p14:sldId id="265"/>
           </p14:sldIdLst>
         </p14:section>
-        <p14:section name="outro" id="{E93196B6-EFE2-3242-B776-C77C0FCFFEF1}">
+        <p14:section name="outro" id="{BF29E249-6E71-4BBE-B175-E1751A1C0B1C}">
           <p14:sldIdLst>
             <p14:sldId id="283"/>
             <p14:sldId id="279"/>
@@ -1172,8 +1172,8 @@
     <dgm:cxn modelId="{1A54CE04-8A96-4E4A-89DB-FB2A1A17744F}" type="presOf" srcId="{7FD8A240-07A6-F345-A4B5-9AFD7D04E09E}" destId="{8C7BF5B7-4285-C94D-AA34-B3807C7E91FB}" srcOrd="0" destOrd="0" presId="urn:microsoft.com/office/officeart/2005/8/layout/vList2"/>
     <dgm:cxn modelId="{63C3212D-1DCF-8044-A3CF-E372F4EA8362}" srcId="{0FC085B4-97CE-2149-B002-3BE96E991E3C}" destId="{11DE7530-2214-3A46-9779-D26EBB89B8D8}" srcOrd="1" destOrd="0" parTransId="{3BEBEC14-E9DD-5C4A-9EAF-10414B491D11}" sibTransId="{92A6A7B2-A1F5-D54F-B97F-04866B340CB4}"/>
     <dgm:cxn modelId="{97FF1C33-165D-9744-B9DD-5FD72C89A0A7}" type="presOf" srcId="{1680333F-291D-CB49-8833-C083699793E0}" destId="{B0272B02-624D-2445-B63B-A4B45C1ED737}" srcOrd="0" destOrd="0" presId="urn:microsoft.com/office/officeart/2005/8/layout/vList2"/>
+    <dgm:cxn modelId="{FBA34671-A6B0-B74F-B2B2-C18DD774C1FA}" type="presOf" srcId="{11DE7530-2214-3A46-9779-D26EBB89B8D8}" destId="{2FB78BDF-7C8F-1F41-8CD6-4B786B18D9FD}" srcOrd="0" destOrd="0" presId="urn:microsoft.com/office/officeart/2005/8/layout/vList2"/>
     <dgm:cxn modelId="{25C03C5A-4ECE-A34E-96BF-DE75E1E0F7EB}" type="presOf" srcId="{0FC085B4-97CE-2149-B002-3BE96E991E3C}" destId="{70B8A340-42D2-FA49-B0EC-FAFE4652EAD9}" srcOrd="0" destOrd="0" presId="urn:microsoft.com/office/officeart/2005/8/layout/vList2"/>
-    <dgm:cxn modelId="{FBA34671-A6B0-B74F-B2B2-C18DD774C1FA}" type="presOf" srcId="{11DE7530-2214-3A46-9779-D26EBB89B8D8}" destId="{2FB78BDF-7C8F-1F41-8CD6-4B786B18D9FD}" srcOrd="0" destOrd="0" presId="urn:microsoft.com/office/officeart/2005/8/layout/vList2"/>
     <dgm:cxn modelId="{96B4197D-2080-E246-BEDB-AC65A9B0EC38}" srcId="{0FC085B4-97CE-2149-B002-3BE96E991E3C}" destId="{A8E42F35-E34E-9E4B-A895-3BC748187CD3}" srcOrd="3" destOrd="0" parTransId="{8D054F3E-704E-1F47-866C-CB97D4DF2B6E}" sibTransId="{976463D6-3DF4-D14D-BDED-C1EC5A591A19}"/>
     <dgm:cxn modelId="{DD996A87-FB18-2B4E-B34F-9E0235E9B363}" srcId="{0FC085B4-97CE-2149-B002-3BE96E991E3C}" destId="{7FD8A240-07A6-F345-A4B5-9AFD7D04E09E}" srcOrd="0" destOrd="0" parTransId="{028B14B4-179B-914A-A696-BC38CCE94176}" sibTransId="{3862C498-2BCA-314C-82B5-D7FF7FA6942A}"/>
     <dgm:cxn modelId="{78A0C8DA-8CE3-C440-99CD-A857846AFA85}" type="presOf" srcId="{A8E42F35-E34E-9E4B-A895-3BC748187CD3}" destId="{E4AF1CAC-D73A-A24F-9293-09183EA92B01}" srcOrd="0" destOrd="0" presId="urn:microsoft.com/office/officeart/2005/8/layout/vList2"/>
@@ -1211,7 +1211,7 @@
       </dsp:nvSpPr>
       <dsp:spPr>
         <a:xfrm>
-          <a:off x="0" y="959475"/>
+          <a:off x="0" y="710216"/>
           <a:ext cx="11481092" cy="694980"/>
         </a:xfrm>
         <a:prstGeom prst="roundRect">
@@ -1277,7 +1277,7 @@
         </a:p>
       </dsp:txBody>
       <dsp:txXfrm>
-        <a:off x="33926" y="993401"/>
+        <a:off x="33926" y="744142"/>
         <a:ext cx="11413240" cy="627128"/>
       </dsp:txXfrm>
     </dsp:sp>
@@ -1288,7 +1288,7 @@
       </dsp:nvSpPr>
       <dsp:spPr>
         <a:xfrm>
-          <a:off x="0" y="1732215"/>
+          <a:off x="0" y="1482956"/>
           <a:ext cx="11481092" cy="694980"/>
         </a:xfrm>
         <a:prstGeom prst="roundRect">
@@ -1354,7 +1354,7 @@
         </a:p>
       </dsp:txBody>
       <dsp:txXfrm>
-        <a:off x="33926" y="1766141"/>
+        <a:off x="33926" y="1516882"/>
         <a:ext cx="11413240" cy="627128"/>
       </dsp:txXfrm>
     </dsp:sp>
@@ -1365,7 +1365,7 @@
       </dsp:nvSpPr>
       <dsp:spPr>
         <a:xfrm>
-          <a:off x="0" y="2504955"/>
+          <a:off x="0" y="2255696"/>
           <a:ext cx="11481092" cy="694980"/>
         </a:xfrm>
         <a:prstGeom prst="roundRect">
@@ -1431,7 +1431,7 @@
         </a:p>
       </dsp:txBody>
       <dsp:txXfrm>
-        <a:off x="33926" y="2538881"/>
+        <a:off x="33926" y="2289622"/>
         <a:ext cx="11413240" cy="627128"/>
       </dsp:txXfrm>
     </dsp:sp>
@@ -1442,7 +1442,7 @@
       </dsp:nvSpPr>
       <dsp:spPr>
         <a:xfrm>
-          <a:off x="0" y="3277695"/>
+          <a:off x="0" y="3028436"/>
           <a:ext cx="11481092" cy="694980"/>
         </a:xfrm>
         <a:prstGeom prst="roundRect">
@@ -1508,7 +1508,7 @@
         </a:p>
       </dsp:txBody>
       <dsp:txXfrm>
-        <a:off x="33926" y="3311621"/>
+        <a:off x="33926" y="3062362"/>
         <a:ext cx="11413240" cy="627128"/>
       </dsp:txXfrm>
     </dsp:sp>
@@ -2766,9 +2766,12 @@
             </a:lvl1pPr>
           </a:lstStyle>
           <a:p>
-            <a:endParaRPr lang="en-US" dirty="0">
-              <a:latin typeface="Segoe UI" pitchFamily="34" charset="0"/>
-            </a:endParaRPr>
+            <a:r>
+              <a:rPr lang="en-US" dirty="0">
+                <a:latin typeface="Segoe UI" pitchFamily="34" charset="0"/>
+              </a:rPr>
+              <a:t>SharePoint Framework</a:t>
+            </a:r>
           </a:p>
         </p:txBody>
       </p:sp>
@@ -2803,7 +2806,7 @@
               <a:rPr lang="en-US" smtClean="0">
                 <a:latin typeface="Segoe UI" pitchFamily="34" charset="0"/>
               </a:rPr>
-              <a:t>12/11/18 1:37 PM</a:t>
+              <a:t>12/20/2018 3:42 PM</a:t>
             </a:fld>
             <a:endParaRPr lang="en-US" dirty="0">
               <a:latin typeface="Segoe UI" pitchFamily="34" charset="0"/>
@@ -2963,7 +2966,10 @@
             </a:lvl1pPr>
           </a:lstStyle>
           <a:p>
-            <a:endParaRPr lang="en-US" dirty="0"/>
+            <a:r>
+              <a:rPr lang="en-US" dirty="0"/>
+              <a:t>SharePoint Framework</a:t>
+            </a:r>
           </a:p>
         </p:txBody>
       </p:sp>
@@ -3097,7 +3103,7 @@
           <a:p>
             <a:fld id="{D18B56EA-E28F-4F92-9F16-7A6F2501B303}" type="datetime8">
               <a:rPr lang="en-US" smtClean="0"/>
-              <a:t>12/11/18 1:37 PM</a:t>
+              <a:t>12/20/2018 3:42 PM</a:t>
             </a:fld>
             <a:endParaRPr lang="en-US" dirty="0"/>
           </a:p>
@@ -3480,7 +3486,7 @@
           <a:p>
             <a:fld id="{D18B56EA-E28F-4F92-9F16-7A6F2501B303}" type="datetime8">
               <a:rPr lang="en-US" smtClean="0"/>
-              <a:t>12/11/18 1:37 PM</a:t>
+              <a:t>12/20/2018 3:43 PM</a:t>
             </a:fld>
             <a:endParaRPr lang="en-US" dirty="0"/>
           </a:p>
@@ -3661,7 +3667,7 @@
           <a:p>
             <a:fld id="{D18B56EA-E28F-4F92-9F16-7A6F2501B303}" type="datetime8">
               <a:rPr lang="en-US" smtClean="0"/>
-              <a:t>12/11/18 1:37 PM</a:t>
+              <a:t>12/20/2018 3:43 PM</a:t>
             </a:fld>
             <a:endParaRPr lang="en-US" dirty="0"/>
           </a:p>
@@ -4004,7 +4010,7 @@
           <a:p>
             <a:fld id="{D18B56EA-E28F-4F92-9F16-7A6F2501B303}" type="datetime8">
               <a:rPr lang="en-US" smtClean="0"/>
-              <a:t>12/11/18 1:37 PM</a:t>
+              <a:t>12/20/2018 3:44 PM</a:t>
             </a:fld>
             <a:endParaRPr lang="en-US" dirty="0"/>
           </a:p>
@@ -4185,7 +4191,7 @@
           <a:p>
             <a:fld id="{D18B56EA-E28F-4F92-9F16-7A6F2501B303}" type="datetime8">
               <a:rPr lang="en-US" smtClean="0"/>
-              <a:t>12/11/18 1:37 PM</a:t>
+              <a:t>12/20/2018 3:44 PM</a:t>
             </a:fld>
             <a:endParaRPr lang="en-US" dirty="0"/>
           </a:p>
@@ -4366,7 +4372,7 @@
           <a:p>
             <a:fld id="{D18B56EA-E28F-4F92-9F16-7A6F2501B303}" type="datetime8">
               <a:rPr lang="en-US" smtClean="0"/>
-              <a:t>12/11/18 1:37 PM</a:t>
+              <a:t>12/20/2018 3:44 PM</a:t>
             </a:fld>
             <a:endParaRPr lang="en-US" dirty="0"/>
           </a:p>
@@ -4547,7 +4553,7 @@
           <a:p>
             <a:fld id="{D18B56EA-E28F-4F92-9F16-7A6F2501B303}" type="datetime8">
               <a:rPr lang="en-US" smtClean="0"/>
-              <a:t>12/11/18 1:37 PM</a:t>
+              <a:t>12/20/2018 3:44 PM</a:t>
             </a:fld>
             <a:endParaRPr lang="en-US" dirty="0"/>
           </a:p>
@@ -8826,7 +8832,7 @@
           <a:lstStyle/>
           <a:p>
             <a:r>
-              <a:rPr lang="en-US"/>
+              <a:rPr lang="en-US" dirty="0"/>
               <a:t>Click icon to add table</a:t>
             </a:r>
           </a:p>
@@ -9273,27 +9279,31 @@
             <p:ph type="title" hasCustomPrompt="1"/>
           </p:nvPr>
         </p:nvSpPr>
-        <p:spPr/>
+        <p:spPr>
+          <a:xfrm>
+            <a:off x="464400" y="633600"/>
+            <a:ext cx="11575200" cy="410369"/>
+          </a:xfrm>
+        </p:spPr>
         <p:txBody>
-          <a:bodyPr/>
+          <a:bodyPr vert="horz" wrap="square" lIns="0" tIns="0" rIns="0" bIns="0" rtlCol="0" anchor="t">
+            <a:spAutoFit/>
+          </a:bodyPr>
           <a:lstStyle>
             <a:lvl1pPr>
-              <a:defRPr>
-                <a:gradFill>
-                  <a:gsLst>
-                    <a:gs pos="1250">
-                      <a:schemeClr val="tx2"/>
-                    </a:gs>
-                    <a:gs pos="100000">
-                      <a:schemeClr val="tx2"/>
-                    </a:gs>
-                  </a:gsLst>
-                  <a:lin ang="5400000" scaled="0"/>
-                </a:gradFill>
+              <a:defRPr lang="en-US" sz="2800" dirty="0">
+                <a:solidFill>
+                  <a:srgbClr val="2F2F2F"/>
+                </a:solidFill>
               </a:defRPr>
             </a:lvl1pPr>
           </a:lstStyle>
           <a:p>
+            <a:pPr lvl="0">
+              <a:lnSpc>
+                <a:spcPts val="3200"/>
+              </a:lnSpc>
+            </a:pPr>
             <a:r>
               <a:rPr lang="en-US" dirty="0"/>
               <a:t>Slide for Developer Code</a:t>
@@ -9386,8 +9396,8 @@
         </p:nvSpPr>
         <p:spPr>
           <a:xfrm>
-            <a:off x="528849" y="1476622"/>
-            <a:ext cx="11378776" cy="2360774"/>
+            <a:off x="464400" y="1178952"/>
+            <a:ext cx="11575200" cy="2658444"/>
           </a:xfrm>
         </p:spPr>
         <p:txBody>
@@ -9502,38 +9512,37 @@
           <a:p>
             <a:pPr lvl="0"/>
             <a:r>
-              <a:rPr lang="en-US"/>
+              <a:rPr lang="en-US" dirty="0"/>
               <a:t>Click to edit Master text styles</a:t>
             </a:r>
           </a:p>
           <a:p>
             <a:pPr lvl="1"/>
             <a:r>
-              <a:rPr lang="en-US"/>
+              <a:rPr lang="en-US" dirty="0"/>
               <a:t>Second level</a:t>
             </a:r>
           </a:p>
           <a:p>
             <a:pPr lvl="2"/>
             <a:r>
-              <a:rPr lang="en-US"/>
+              <a:rPr lang="en-US" dirty="0"/>
               <a:t>Third level</a:t>
             </a:r>
           </a:p>
           <a:p>
             <a:pPr lvl="3"/>
             <a:r>
-              <a:rPr lang="en-US"/>
+              <a:rPr lang="en-US" dirty="0"/>
               <a:t>Fourth level</a:t>
             </a:r>
           </a:p>
           <a:p>
             <a:pPr lvl="4"/>
             <a:r>
-              <a:rPr lang="en-US"/>
+              <a:rPr lang="en-US" dirty="0"/>
               <a:t>Fifth level</a:t>
             </a:r>
-            <a:endParaRPr lang="en-US" dirty="0"/>
           </a:p>
         </p:txBody>
       </p:sp>
@@ -9570,36 +9579,6 @@
           <a:chExt cx="0" cy="0"/>
         </a:xfrm>
       </p:grpSpPr>
-      <p:pic>
-        <p:nvPicPr>
-          <p:cNvPr id="7" name="Picture 6"/>
-          <p:cNvPicPr>
-            <a:picLocks noChangeAspect="1"/>
-          </p:cNvPicPr>
-          <p:nvPr userDrawn="1"/>
-        </p:nvPicPr>
-        <p:blipFill>
-          <a:blip r:embed="rId2" cstate="screen">
-            <a:extLst>
-              <a:ext uri="{28A0092B-C50C-407E-A947-70E740481C1C}">
-                <a14:useLocalDpi xmlns:a14="http://schemas.microsoft.com/office/drawing/2010/main"/>
-              </a:ext>
-            </a:extLst>
-          </a:blip>
-          <a:stretch>
-            <a:fillRect/>
-          </a:stretch>
-        </p:blipFill>
-        <p:spPr>
-          <a:xfrm>
-            <a:off x="10933639" y="6533467"/>
-            <a:ext cx="1501954" cy="477297"/>
-          </a:xfrm>
-          <a:prstGeom prst="rect">
-            <a:avLst/>
-          </a:prstGeom>
-        </p:spPr>
-      </p:pic>
       <p:sp>
         <p:nvSpPr>
           <p:cNvPr id="2" name="Title 1"/>
@@ -9610,16 +9589,35 @@
             <p:ph type="title"/>
           </p:nvPr>
         </p:nvSpPr>
-        <p:spPr/>
+        <p:spPr>
+          <a:xfrm>
+            <a:off x="464400" y="633600"/>
+            <a:ext cx="11574000" cy="410369"/>
+          </a:xfrm>
+        </p:spPr>
         <p:txBody>
-          <a:bodyPr/>
-          <a:lstStyle/>
-          <a:p>
-            <a:r>
-              <a:rPr lang="en-US"/>
+          <a:bodyPr vert="horz" wrap="square" lIns="0" tIns="0" rIns="0" bIns="0" rtlCol="0" anchor="t">
+            <a:spAutoFit/>
+          </a:bodyPr>
+          <a:lstStyle>
+            <a:lvl1pPr>
+              <a:defRPr lang="en-US" sz="2800" dirty="0">
+                <a:solidFill>
+                  <a:srgbClr val="2F2F2F"/>
+                </a:solidFill>
+              </a:defRPr>
+            </a:lvl1pPr>
+          </a:lstStyle>
+          <a:p>
+            <a:pPr lvl="0">
+              <a:lnSpc>
+                <a:spcPts val="3200"/>
+              </a:lnSpc>
+            </a:pPr>
+            <a:r>
+              <a:rPr lang="en-US" dirty="0"/>
               <a:t>Click to edit Master title style</a:t>
             </a:r>
-            <a:endParaRPr lang="en-US" dirty="0"/>
           </a:p>
         </p:txBody>
       </p:sp>
@@ -9635,8 +9633,8 @@
         </p:nvSpPr>
         <p:spPr>
           <a:xfrm>
-            <a:off x="274638" y="1212850"/>
-            <a:ext cx="11887200" cy="1889748"/>
+            <a:off x="464400" y="1212850"/>
+            <a:ext cx="11574000" cy="1346522"/>
           </a:xfrm>
         </p:spPr>
         <p:txBody>
@@ -9644,7 +9642,7 @@
           <a:lstStyle>
             <a:lvl1pPr marL="0" indent="0">
               <a:buNone/>
-              <a:defRPr>
+              <a:defRPr sz="2400">
                 <a:solidFill>
                   <a:schemeClr val="tx2"/>
                 </a:solidFill>
@@ -9653,56 +9651,55 @@
             <a:lvl2pPr marL="0" indent="0">
               <a:buFontTx/>
               <a:buNone/>
-              <a:defRPr sz="2000"/>
+              <a:defRPr sz="1400"/>
             </a:lvl2pPr>
             <a:lvl3pPr marL="228600" indent="0">
               <a:buNone/>
-              <a:defRPr sz="1800"/>
+              <a:defRPr sz="1200"/>
             </a:lvl3pPr>
             <a:lvl4pPr marL="457200" indent="0">
               <a:buNone/>
-              <a:defRPr sz="1600"/>
+              <a:defRPr sz="1100"/>
             </a:lvl4pPr>
             <a:lvl5pPr marL="685800" indent="0">
               <a:buNone/>
-              <a:defRPr sz="1400"/>
+              <a:defRPr sz="1050"/>
             </a:lvl5pPr>
           </a:lstStyle>
           <a:p>
             <a:pPr lvl="0"/>
             <a:r>
-              <a:rPr lang="en-US"/>
+              <a:rPr lang="en-US" dirty="0"/>
               <a:t>Edit Master text styles</a:t>
             </a:r>
           </a:p>
           <a:p>
             <a:pPr lvl="1"/>
             <a:r>
-              <a:rPr lang="en-US"/>
+              <a:rPr lang="en-US" dirty="0"/>
               <a:t>Second level</a:t>
             </a:r>
           </a:p>
           <a:p>
             <a:pPr lvl="2"/>
             <a:r>
-              <a:rPr lang="en-US"/>
+              <a:rPr lang="en-US" dirty="0"/>
               <a:t>Third level</a:t>
             </a:r>
           </a:p>
           <a:p>
             <a:pPr lvl="3"/>
             <a:r>
-              <a:rPr lang="en-US"/>
+              <a:rPr lang="en-US" dirty="0"/>
               <a:t>Fourth level</a:t>
             </a:r>
           </a:p>
           <a:p>
             <a:pPr lvl="4"/>
             <a:r>
-              <a:rPr lang="en-US"/>
+              <a:rPr lang="en-US" dirty="0"/>
               <a:t>Fifth level</a:t>
             </a:r>
-            <a:endParaRPr lang="en-US" dirty="0"/>
           </a:p>
         </p:txBody>
       </p:sp>
@@ -9751,8 +9748,8 @@
         </p:nvSpPr>
         <p:spPr>
           <a:xfrm>
-            <a:off x="274638" y="1212850"/>
-            <a:ext cx="11887200" cy="2240229"/>
+            <a:off x="464400" y="1212850"/>
+            <a:ext cx="11574000" cy="1566583"/>
           </a:xfrm>
         </p:spPr>
         <p:txBody>
@@ -9760,51 +9757,56 @@
             <a:spAutoFit/>
           </a:bodyPr>
           <a:lstStyle>
+            <a:lvl1pPr>
+              <a:defRPr sz="2400"/>
+            </a:lvl1pPr>
+            <a:lvl2pPr>
+              <a:defRPr sz="1800"/>
+            </a:lvl2pPr>
             <a:lvl3pPr>
-              <a:defRPr sz="2399"/>
+              <a:defRPr sz="1600"/>
             </a:lvl3pPr>
             <a:lvl4pPr>
-              <a:defRPr sz="1999"/>
+              <a:defRPr sz="1400"/>
             </a:lvl4pPr>
             <a:lvl5pPr>
-              <a:defRPr sz="1999"/>
+              <a:defRPr sz="1400"/>
             </a:lvl5pPr>
           </a:lstStyle>
           <a:p>
             <a:pPr lvl="0"/>
             <a:r>
-              <a:rPr lang="en-US"/>
+              <a:rPr lang="en-US" dirty="0"/>
               <a:t>Edit Master text styles</a:t>
             </a:r>
           </a:p>
           <a:p>
             <a:pPr lvl="1"/>
             <a:r>
-              <a:rPr lang="en-US"/>
+              <a:rPr lang="en-US" dirty="0"/>
               <a:t>Second level</a:t>
             </a:r>
           </a:p>
           <a:p>
             <a:pPr lvl="2"/>
             <a:r>
-              <a:rPr lang="en-US"/>
+              <a:rPr lang="en-US" dirty="0"/>
               <a:t>Third level</a:t>
             </a:r>
           </a:p>
           <a:p>
             <a:pPr lvl="3"/>
             <a:r>
-              <a:rPr lang="en-US"/>
+              <a:rPr lang="en-US" dirty="0"/>
               <a:t>Fourth level</a:t>
             </a:r>
           </a:p>
           <a:p>
             <a:pPr lvl="4"/>
             <a:r>
-              <a:rPr lang="en-US"/>
+              <a:rPr lang="en-US" dirty="0"/>
               <a:t>Fifth level</a:t>
             </a:r>
-            <a:endParaRPr lang="en-US" dirty="0"/>
           </a:p>
         </p:txBody>
       </p:sp>
@@ -9818,13 +9820,33 @@
             <p:ph type="title"/>
           </p:nvPr>
         </p:nvSpPr>
-        <p:spPr/>
+        <p:spPr>
+          <a:xfrm>
+            <a:off x="464400" y="633600"/>
+            <a:ext cx="11574000" cy="410369"/>
+          </a:xfrm>
+        </p:spPr>
         <p:txBody>
-          <a:bodyPr/>
-          <a:lstStyle/>
-          <a:p>
-            <a:r>
-              <a:rPr lang="en-US"/>
+          <a:bodyPr vert="horz" wrap="square" lIns="0" tIns="0" rIns="0" bIns="0" rtlCol="0" anchor="t">
+            <a:spAutoFit/>
+          </a:bodyPr>
+          <a:lstStyle>
+            <a:lvl1pPr>
+              <a:defRPr lang="en-US" sz="2800">
+                <a:solidFill>
+                  <a:srgbClr val="2F2F2F"/>
+                </a:solidFill>
+              </a:defRPr>
+            </a:lvl1pPr>
+          </a:lstStyle>
+          <a:p>
+            <a:pPr lvl="0">
+              <a:lnSpc>
+                <a:spcPts val="3200"/>
+              </a:lnSpc>
+            </a:pPr>
+            <a:r>
+              <a:rPr lang="en-US" dirty="0"/>
               <a:t>Click to edit Master title style</a:t>
             </a:r>
           </a:p>
@@ -9833,7 +9855,7 @@
     </p:spTree>
     <p:extLst>
       <p:ext uri="{BB962C8B-B14F-4D97-AF65-F5344CB8AC3E}">
-        <p14:creationId xmlns:p14="http://schemas.microsoft.com/office/powerpoint/2010/main" val="3733558018"/>
+        <p14:creationId xmlns:p14="http://schemas.microsoft.com/office/powerpoint/2010/main" val="2439250095"/>
       </p:ext>
     </p:extLst>
   </p:cSld>
@@ -16744,7 +16766,7 @@
     <p:sldLayoutId id="2147484299" r:id="rId25"/>
     <p:sldLayoutId id="2147484552" r:id="rId26"/>
     <p:sldLayoutId id="2147484556" r:id="rId27"/>
-    <p:sldLayoutId id="2147484558" r:id="rId28"/>
+    <p:sldLayoutId id="2147484559" r:id="rId28"/>
   </p:sldLayoutIdLst>
   <p:transition>
     <p:fade/>
@@ -17375,14 +17397,14 @@
           <p:nvPr>
             <p:extLst>
               <p:ext uri="{D42A27DB-BD31-4B8C-83A1-F6EECF244321}">
-                <p14:modId xmlns:p14="http://schemas.microsoft.com/office/powerpoint/2010/main" val="314501925"/>
+                <p14:modId xmlns:p14="http://schemas.microsoft.com/office/powerpoint/2010/main" val="4117835181"/>
               </p:ext>
             </p:extLst>
           </p:nvPr>
         </p:nvGraphicFramePr>
         <p:xfrm>
           <a:off x="444207" y="1429840"/>
-          <a:ext cx="11481092" cy="4932150"/>
+          <a:ext cx="11481092" cy="4433632"/>
         </p:xfrm>
         <a:graphic>
           <a:graphicData uri="http://schemas.openxmlformats.org/drawingml/2006/diagram">
@@ -17439,12 +17461,7 @@
             <p:ph type="body" sz="quarter" idx="10"/>
           </p:nvPr>
         </p:nvSpPr>
-        <p:spPr>
-          <a:xfrm>
-            <a:off x="274638" y="1212850"/>
-            <a:ext cx="11887200" cy="5700022"/>
-          </a:xfrm>
-        </p:spPr>
+        <p:spPr/>
         <p:txBody>
           <a:bodyPr/>
           <a:lstStyle/>
@@ -17482,20 +17499,10 @@
           <a:p>
             <a:r>
               <a:rPr lang="en-US" dirty="0"/>
-              <a:t>Default experience by presence of</a:t>
-            </a:r>
-            <a:r>
-              <a:rPr lang="en-US" dirty="0">
-                <a:latin typeface="Courier New" panose="02070309020205020404" pitchFamily="49" charset="0"/>
-                <a:cs typeface="Courier New" panose="02070309020205020404" pitchFamily="49" charset="0"/>
-              </a:rPr>
-              <a:t> </a:t>
-            </a:r>
-            <a:r>
-              <a:rPr lang="en-US" dirty="0" err="1">
-                <a:latin typeface="Courier New" panose="02070309020205020404" pitchFamily="49" charset="0"/>
-                <a:cs typeface="Courier New" panose="02070309020205020404" pitchFamily="49" charset="0"/>
-              </a:rPr>
+              <a:t>Default experience by presence of </a:t>
+            </a:r>
+            <a:r>
+              <a:rPr lang="en-US" dirty="0" err="1"/>
               <a:t>ClientSideInstances.xml</a:t>
             </a:r>
             <a:r>
@@ -17511,7 +17518,7 @@
           <a:p>
             <a:pPr lvl="1"/>
             <a:r>
-              <a:rPr lang="en-US" i="1" dirty="0"/>
+              <a:rPr lang="en-US" dirty="0"/>
               <a:t>Delete this file if tenant wide deployment not desired</a:t>
             </a:r>
           </a:p>
@@ -17594,18 +17601,13 @@
             <p:ph type="body" sz="quarter" idx="10"/>
           </p:nvPr>
         </p:nvSpPr>
-        <p:spPr>
-          <a:xfrm>
-            <a:off x="274638" y="1212850"/>
-            <a:ext cx="11887200" cy="627864"/>
-          </a:xfrm>
-        </p:spPr>
+        <p:spPr/>
         <p:txBody>
           <a:bodyPr/>
           <a:lstStyle/>
           <a:p>
             <a:r>
-              <a:rPr lang="en-US" sz="3200" dirty="0"/>
+              <a:rPr lang="en-US" dirty="0"/>
               <a:t>Control tenant wide deployments with this app catalog list</a:t>
             </a:r>
           </a:p>
@@ -17654,14 +17656,14 @@
           <p:nvPr>
             <p:extLst>
               <p:ext uri="{D42A27DB-BD31-4B8C-83A1-F6EECF244321}">
-                <p14:modId xmlns:p14="http://schemas.microsoft.com/office/powerpoint/2010/main" val="2919509828"/>
+                <p14:modId xmlns:p14="http://schemas.microsoft.com/office/powerpoint/2010/main" val="4078782163"/>
               </p:ext>
             </p:extLst>
           </p:nvPr>
         </p:nvGraphicFramePr>
         <p:xfrm>
-          <a:off x="1129779" y="1880873"/>
-          <a:ext cx="10002369" cy="4990505"/>
+          <a:off x="1343986" y="1861320"/>
+          <a:ext cx="9814827" cy="4707544"/>
         </p:xfrm>
         <a:graphic>
           <a:graphicData uri="http://schemas.openxmlformats.org/drawingml/2006/table">
@@ -17670,21 +17672,21 @@
                 <a:tableStyleId>{21E4AEA4-8DFA-4A89-87EB-49C32662AFE0}</a:tableStyleId>
               </a:tblPr>
               <a:tblGrid>
-                <a:gridCol w="1893120">
+                <a:gridCol w="1857624">
                   <a:extLst>
                     <a:ext uri="{9D8B030D-6E8A-4147-A177-3AD203B41FA5}">
                       <a16:colId xmlns:a16="http://schemas.microsoft.com/office/drawing/2014/main" val="1760796699"/>
                     </a:ext>
                   </a:extLst>
                 </a:gridCol>
-                <a:gridCol w="1409252">
+                <a:gridCol w="1382829">
                   <a:extLst>
                     <a:ext uri="{9D8B030D-6E8A-4147-A177-3AD203B41FA5}">
                       <a16:colId xmlns:a16="http://schemas.microsoft.com/office/drawing/2014/main" val="1305644161"/>
                     </a:ext>
                   </a:extLst>
                 </a:gridCol>
-                <a:gridCol w="6699997">
+                <a:gridCol w="6574374">
                   <a:extLst>
                     <a:ext uri="{9D8B030D-6E8A-4147-A177-3AD203B41FA5}">
                       <a16:colId xmlns:a16="http://schemas.microsoft.com/office/drawing/2014/main" val="338486701"/>
@@ -17692,7 +17694,7 @@
                   </a:extLst>
                 </a:gridCol>
               </a:tblGrid>
-              <a:tr h="301451">
+              <a:tr h="323079">
                 <a:tc>
                   <a:txBody>
                     <a:bodyPr/>
@@ -17700,7 +17702,7 @@
                     <a:p>
                       <a:pPr algn="r"/>
                       <a:r>
-                        <a:rPr lang="en-US" dirty="0"/>
+                        <a:rPr lang="en-US" sz="1600" dirty="0"/>
                         <a:t>Column</a:t>
                       </a:r>
                     </a:p>
@@ -17714,7 +17716,7 @@
                     <a:p>
                       <a:pPr algn="ctr"/>
                       <a:r>
-                        <a:rPr lang="en-US" dirty="0"/>
+                        <a:rPr lang="en-US" sz="1600" dirty="0"/>
                         <a:t>Type</a:t>
                       </a:r>
                     </a:p>
@@ -17727,7 +17729,7 @@
                     <a:lstStyle/>
                     <a:p>
                       <a:r>
-                        <a:rPr lang="en-US" dirty="0"/>
+                        <a:rPr lang="en-US" sz="1600" dirty="0"/>
                         <a:t>Description</a:t>
                       </a:r>
                     </a:p>
@@ -17740,7 +17742,7 @@
                   </a:ext>
                 </a:extLst>
               </a:tr>
-              <a:tr h="743304">
+              <a:tr h="716255">
                 <a:tc>
                   <a:txBody>
                     <a:bodyPr/>
@@ -17748,7 +17750,7 @@
                     <a:p>
                       <a:pPr algn="r"/>
                       <a:r>
-                        <a:rPr lang="en-US" dirty="0"/>
+                        <a:rPr lang="en-US" sz="1600" dirty="0"/>
                         <a:t>Title</a:t>
                       </a:r>
                     </a:p>
@@ -17762,7 +17764,7 @@
                     <a:p>
                       <a:pPr algn="ctr"/>
                       <a:r>
-                        <a:rPr lang="en-US" dirty="0"/>
+                        <a:rPr lang="en-US" sz="1600" dirty="0"/>
                         <a:t>string</a:t>
                       </a:r>
                     </a:p>
@@ -17775,7 +17777,7 @@
                     <a:lstStyle/>
                     <a:p>
                       <a:r>
-                        <a:rPr lang="en-US" sz="1800" b="0" i="0" kern="1200" dirty="0">
+                        <a:rPr lang="en-US" sz="1600" b="0" i="0" kern="1200" dirty="0">
                           <a:solidFill>
                             <a:schemeClr val="dk1"/>
                           </a:solidFill>
@@ -17786,7 +17788,7 @@
                         </a:rPr>
                         <a:t>Title of the entry. Can be descriptive entry for the registration. Doesn’t have to match anything, just for your reference</a:t>
                       </a:r>
-                      <a:endParaRPr lang="en-US" dirty="0"/>
+                      <a:endParaRPr lang="en-US" sz="1600" dirty="0"/>
                     </a:p>
                   </a:txBody>
                   <a:tcPr/>
@@ -17797,7 +17799,7 @@
                   </a:ext>
                 </a:extLst>
               </a:tr>
-              <a:tr h="743304">
+              <a:tr h="716255">
                 <a:tc>
                   <a:txBody>
                     <a:bodyPr/>
@@ -17805,7 +17807,7 @@
                     <a:p>
                       <a:pPr algn="r"/>
                       <a:r>
-                        <a:rPr lang="en-US" dirty="0"/>
+                        <a:rPr lang="en-US" sz="1600" dirty="0"/>
                         <a:t>Component ID</a:t>
                       </a:r>
                     </a:p>
@@ -17819,7 +17821,7 @@
                     <a:p>
                       <a:pPr algn="ctr"/>
                       <a:r>
-                        <a:rPr lang="en-US" dirty="0"/>
+                        <a:rPr lang="en-US" sz="1600" dirty="0"/>
                         <a:t>GUID</a:t>
                       </a:r>
                     </a:p>
@@ -17832,7 +17834,7 @@
                     <a:lstStyle/>
                     <a:p>
                       <a:r>
-                        <a:rPr lang="en-US" sz="1800" b="0" i="0" kern="1200" dirty="0">
+                        <a:rPr lang="en-US" sz="1600" b="0" i="0" kern="1200" dirty="0">
                           <a:solidFill>
                             <a:schemeClr val="dk1"/>
                           </a:solidFill>
@@ -17843,7 +17845,7 @@
                         </a:rPr>
                         <a:t>Manifest ID of the component. Has to be in GUID format and component must exists in the app catalog.</a:t>
                       </a:r>
-                      <a:endParaRPr lang="en-US" dirty="0"/>
+                      <a:endParaRPr lang="en-US" sz="1600" dirty="0"/>
                     </a:p>
                   </a:txBody>
                   <a:tcPr/>
@@ -17854,7 +17856,7 @@
                   </a:ext>
                 </a:extLst>
               </a:tr>
-              <a:tr h="301451">
+              <a:tr h="558046">
                 <a:tc>
                   <a:txBody>
                     <a:bodyPr/>
@@ -17862,7 +17864,7 @@
                     <a:p>
                       <a:pPr algn="r"/>
                       <a:r>
-                        <a:rPr lang="en-US" dirty="0"/>
+                        <a:rPr lang="en-US" sz="1600" dirty="0"/>
                         <a:t>Component Properties</a:t>
                       </a:r>
                     </a:p>
@@ -17876,7 +17878,7 @@
                     <a:p>
                       <a:pPr algn="ctr"/>
                       <a:r>
-                        <a:rPr lang="en-US" dirty="0"/>
+                        <a:rPr lang="en-US" sz="1600" dirty="0"/>
                         <a:t>string</a:t>
                       </a:r>
                     </a:p>
@@ -17889,7 +17891,7 @@
                     <a:lstStyle/>
                     <a:p>
                       <a:r>
-                        <a:rPr lang="en-US" sz="1800" b="0" i="0" kern="1200" dirty="0">
+                        <a:rPr lang="en-US" sz="1600" b="0" i="0" kern="1200" dirty="0">
                           <a:solidFill>
                             <a:schemeClr val="dk1"/>
                           </a:solidFill>
@@ -17900,7 +17902,7 @@
                         </a:rPr>
                         <a:t>Optional component properties.</a:t>
                       </a:r>
-                      <a:endParaRPr lang="en-US" dirty="0"/>
+                      <a:endParaRPr lang="en-US" sz="1600" dirty="0"/>
                     </a:p>
                   </a:txBody>
                   <a:tcPr/>
@@ -17911,7 +17913,7 @@
                   </a:ext>
                 </a:extLst>
               </a:tr>
-              <a:tr h="520313">
+              <a:tr h="501379">
                 <a:tc>
                   <a:txBody>
                     <a:bodyPr/>
@@ -17919,7 +17921,7 @@
                     <a:p>
                       <a:pPr algn="r"/>
                       <a:r>
-                        <a:rPr lang="en-US" dirty="0"/>
+                        <a:rPr lang="en-US" sz="1600" dirty="0"/>
                         <a:t>Web Template</a:t>
                       </a:r>
                     </a:p>
@@ -17949,7 +17951,7 @@
                         <a:defRPr/>
                       </a:pPr>
                       <a:r>
-                        <a:rPr lang="en-US" dirty="0"/>
+                        <a:rPr lang="en-US" sz="1600" dirty="0"/>
                         <a:t>string</a:t>
                       </a:r>
                     </a:p>
@@ -17962,7 +17964,7 @@
                     <a:lstStyle/>
                     <a:p>
                       <a:r>
-                        <a:rPr lang="en-US" sz="1800" b="0" i="0" kern="1200" dirty="0">
+                        <a:rPr lang="en-US" sz="1600" b="0" i="0" kern="1200" dirty="0">
                           <a:solidFill>
                             <a:schemeClr val="dk1"/>
                           </a:solidFill>
@@ -17973,7 +17975,7 @@
                         </a:rPr>
                         <a:t>Can be used to target extension only to specific web template. </a:t>
                       </a:r>
-                      <a:endParaRPr lang="en-US" dirty="0"/>
+                      <a:endParaRPr lang="en-US" sz="1600" dirty="0"/>
                     </a:p>
                   </a:txBody>
                   <a:tcPr/>
@@ -17984,7 +17986,7 @@
                   </a:ext>
                 </a:extLst>
               </a:tr>
-              <a:tr h="301451">
+              <a:tr h="323079">
                 <a:tc>
                   <a:txBody>
                     <a:bodyPr/>
@@ -17992,7 +17994,7 @@
                     <a:p>
                       <a:pPr algn="r"/>
                       <a:r>
-                        <a:rPr lang="en-US" dirty="0"/>
+                        <a:rPr lang="en-US" sz="1600" dirty="0"/>
                         <a:t>List Template</a:t>
                       </a:r>
                     </a:p>
@@ -18006,10 +18008,10 @@
                     <a:p>
                       <a:pPr algn="ctr"/>
                       <a:r>
-                        <a:rPr lang="en-US" dirty="0" err="1"/>
+                        <a:rPr lang="en-US" sz="1600" dirty="0" err="1"/>
                         <a:t>int</a:t>
                       </a:r>
-                      <a:endParaRPr lang="en-US" dirty="0"/>
+                      <a:endParaRPr lang="en-US" sz="1600" dirty="0"/>
                     </a:p>
                   </a:txBody>
                   <a:tcPr/>
@@ -18020,7 +18022,7 @@
                     <a:lstStyle/>
                     <a:p>
                       <a:r>
-                        <a:rPr lang="en-US" sz="1800" b="0" i="0" kern="1200" dirty="0">
+                        <a:rPr lang="en-US" sz="1600" b="0" i="0" kern="1200" dirty="0">
                           <a:solidFill>
                             <a:schemeClr val="dk1"/>
                           </a:solidFill>
@@ -18031,7 +18033,7 @@
                         </a:rPr>
                         <a:t>List type as a number. </a:t>
                       </a:r>
-                      <a:endParaRPr lang="en-US" dirty="0"/>
+                      <a:endParaRPr lang="en-US" sz="1600" dirty="0"/>
                     </a:p>
                   </a:txBody>
                   <a:tcPr/>
@@ -18042,7 +18044,7 @@
                   </a:ext>
                 </a:extLst>
               </a:tr>
-              <a:tr h="743304">
+              <a:tr h="716255">
                 <a:tc>
                   <a:txBody>
                     <a:bodyPr/>
@@ -18050,7 +18052,7 @@
                     <a:p>
                       <a:pPr algn="r"/>
                       <a:r>
-                        <a:rPr lang="en-US" dirty="0"/>
+                        <a:rPr lang="en-US" sz="1600" dirty="0"/>
                         <a:t>Location</a:t>
                       </a:r>
                     </a:p>
@@ -18080,7 +18082,7 @@
                         <a:defRPr/>
                       </a:pPr>
                       <a:r>
-                        <a:rPr lang="en-US" dirty="0"/>
+                        <a:rPr lang="en-US" sz="1600" dirty="0"/>
                         <a:t>string</a:t>
                       </a:r>
                     </a:p>
@@ -18093,7 +18095,7 @@
                     <a:lstStyle/>
                     <a:p>
                       <a:r>
-                        <a:rPr lang="en-US" sz="1800" b="0" i="0" kern="1200" dirty="0">
+                        <a:rPr lang="en-US" sz="1600" b="0" i="0" kern="1200" dirty="0">
                           <a:solidFill>
                             <a:schemeClr val="dk1"/>
                           </a:solidFill>
@@ -18104,7 +18106,7 @@
                         </a:rPr>
                         <a:t>Location of the entry. There are different support locations for application customizers and List View Command Sets.</a:t>
                       </a:r>
-                      <a:endParaRPr lang="en-US" dirty="0"/>
+                      <a:endParaRPr lang="en-US" sz="1600" dirty="0"/>
                     </a:p>
                   </a:txBody>
                   <a:tcPr/>
@@ -18115,7 +18117,7 @@
                   </a:ext>
                 </a:extLst>
               </a:tr>
-              <a:tr h="408817">
+              <a:tr h="455248">
                 <a:tc>
                   <a:txBody>
                     <a:bodyPr/>
@@ -18123,7 +18125,7 @@
                     <a:p>
                       <a:pPr algn="r"/>
                       <a:r>
-                        <a:rPr lang="en-US" dirty="0"/>
+                        <a:rPr lang="en-US" sz="1600" dirty="0"/>
                         <a:t>Sequence</a:t>
                       </a:r>
                     </a:p>
@@ -18137,10 +18139,10 @@
                     <a:p>
                       <a:pPr algn="ctr"/>
                       <a:r>
-                        <a:rPr lang="en-US" dirty="0" err="1"/>
+                        <a:rPr lang="en-US" sz="1600" dirty="0" err="1"/>
                         <a:t>int</a:t>
                       </a:r>
-                      <a:endParaRPr lang="en-US" dirty="0"/>
+                      <a:endParaRPr lang="en-US" sz="1600" dirty="0"/>
                     </a:p>
                   </a:txBody>
                   <a:tcPr/>
@@ -18152,7 +18154,7 @@
                     <a:p>
                       <a:pPr fontAlgn="t"/>
                       <a:r>
-                        <a:rPr lang="en-US" dirty="0">
+                        <a:rPr lang="en-US" sz="1600" dirty="0">
                           <a:effectLst/>
                         </a:rPr>
                         <a:t>Sequence of the entry in rendering.</a:t>
@@ -18167,7 +18169,7 @@
                   </a:ext>
                 </a:extLst>
               </a:tr>
-              <a:tr h="301451">
+              <a:tr h="323079">
                 <a:tc>
                   <a:txBody>
                     <a:bodyPr/>
@@ -18175,7 +18177,7 @@
                     <a:p>
                       <a:pPr algn="r"/>
                       <a:r>
-                        <a:rPr lang="en-US" dirty="0"/>
+                        <a:rPr lang="en-US" sz="1600" dirty="0"/>
                         <a:t>Disabled</a:t>
                       </a:r>
                     </a:p>
@@ -18189,7 +18191,7 @@
                     <a:p>
                       <a:pPr algn="ctr"/>
                       <a:r>
-                        <a:rPr lang="en-US" dirty="0"/>
+                        <a:rPr lang="en-US" sz="1600" dirty="0"/>
                         <a:t>Boolean</a:t>
                       </a:r>
                     </a:p>
@@ -18202,7 +18204,7 @@
                     <a:lstStyle/>
                     <a:p>
                       <a:r>
-                        <a:rPr lang="en-US" dirty="0"/>
+                        <a:rPr lang="en-US" sz="1600" dirty="0"/>
                         <a:t>Enabled state of the deployment.</a:t>
                       </a:r>
                     </a:p>
@@ -18270,8 +18272,8 @@
         </p:nvSpPr>
         <p:spPr>
           <a:xfrm>
-            <a:off x="274638" y="1212850"/>
-            <a:ext cx="11887200" cy="4770537"/>
+            <a:off x="464400" y="1212850"/>
+            <a:ext cx="11574000" cy="1566583"/>
           </a:xfrm>
         </p:spPr>
         <p:txBody>
@@ -18339,15 +18341,7 @@
             <a:pPr lvl="1"/>
             <a:r>
               <a:rPr lang="en-US" dirty="0"/>
-              <a:t>Add 3</a:t>
-            </a:r>
-            <a:r>
-              <a:rPr lang="en-US" baseline="30000" dirty="0"/>
-              <a:t>rd</a:t>
-            </a:r>
-            <a:r>
-              <a:rPr lang="en-US" dirty="0"/>
-              <a:t> party libraries to every page (</a:t>
+              <a:t>Add 3rd party libraries to every page (</a:t>
             </a:r>
             <a:r>
               <a:rPr lang="en-US" dirty="0" err="1"/>
@@ -18444,12 +18438,7 @@
             <p:ph type="body" sz="quarter" idx="10"/>
           </p:nvPr>
         </p:nvSpPr>
-        <p:spPr>
-          <a:xfrm>
-            <a:off x="274638" y="1212850"/>
-            <a:ext cx="11887200" cy="3958007"/>
-          </a:xfrm>
-        </p:spPr>
+        <p:spPr/>
         <p:txBody>
           <a:bodyPr/>
           <a:lstStyle/>
@@ -18524,7 +18513,7 @@
       </p:sp>
       <p:pic>
         <p:nvPicPr>
-          <p:cNvPr id="4" name="Picture 3" descr="A screenshot of a social media post&#13;&#10;&#13;&#10;Description automatically generated">
+          <p:cNvPr id="4" name="Picture 3" descr="A screenshot of a social media post&#10;&#10;Description automatically generated">
             <a:extLst>
               <a:ext uri="{FF2B5EF4-FFF2-40B4-BE49-F238E27FC236}">
                 <a16:creationId xmlns:a16="http://schemas.microsoft.com/office/drawing/2014/main" id="{F9F56E18-9972-E341-B291-0A2B8AA51815}"/>
@@ -18544,7 +18533,7 @@
         </p:blipFill>
         <p:spPr>
           <a:xfrm>
-            <a:off x="6209581" y="2414366"/>
+            <a:off x="5606266" y="1886465"/>
             <a:ext cx="5700511" cy="4284885"/>
           </a:xfrm>
           <a:prstGeom prst="rect">
@@ -18636,7 +18625,7 @@
           <a:bodyPr/>
           <a:lstStyle/>
           <a:p>
-            <a:endParaRPr lang="en-US"/>
+            <a:endParaRPr lang="en-US" dirty="0"/>
           </a:p>
         </p:txBody>
       </p:sp>
@@ -18659,7 +18648,7 @@
         <p:spPr>
           <a:xfrm>
             <a:off x="528849" y="1476622"/>
-            <a:ext cx="11378776" cy="5798510"/>
+            <a:ext cx="11378776" cy="5515356"/>
           </a:xfrm>
         </p:spPr>
         <p:txBody>
@@ -18912,12 +18901,6 @@
               <a:rPr lang="en-US" sz="1600" dirty="0"/>
               <a:t>}</a:t>
             </a:r>
-          </a:p>
-          <a:p>
-            <a:pPr marL="0" indent="0">
-              <a:buNone/>
-            </a:pPr>
-            <a:endParaRPr lang="en-US" sz="1600" dirty="0"/>
           </a:p>
         </p:txBody>
       </p:sp>
@@ -19894,7 +19877,7 @@
     </p:spTree>
     <p:extLst>
       <p:ext uri="{BB962C8B-B14F-4D97-AF65-F5344CB8AC3E}">
-        <p14:creationId xmlns:p14="http://schemas.microsoft.com/office/powerpoint/2010/main" val="1745997778"/>
+        <p14:creationId xmlns:p14="http://schemas.microsoft.com/office/powerpoint/2010/main" val="3690834647"/>
       </p:ext>
     </p:extLst>
   </p:cSld>
@@ -20311,8 +20294,8 @@
         </p:nvSpPr>
         <p:spPr>
           <a:xfrm>
-            <a:off x="274638" y="1212850"/>
-            <a:ext cx="11887200" cy="5379934"/>
+            <a:off x="464400" y="1212850"/>
+            <a:ext cx="11574000" cy="3259354"/>
           </a:xfrm>
         </p:spPr>
         <p:txBody>
@@ -20372,7 +20355,7 @@
             <a:pPr lvl="1"/>
             <a:r>
               <a:rPr lang="en-US" dirty="0"/>
-              <a:t>Client Side Rendering &amp; </a:t>
+              <a:t>Client-Side Rendering &amp; </a:t>
             </a:r>
             <a:r>
               <a:rPr lang="en-US" dirty="0" err="1"/>
@@ -20466,12 +20449,7 @@
             <p:ph type="body" sz="quarter" idx="10"/>
           </p:nvPr>
         </p:nvSpPr>
-        <p:spPr>
-          <a:xfrm>
-            <a:off x="274638" y="1212850"/>
-            <a:ext cx="11887200" cy="683264"/>
-          </a:xfrm>
-        </p:spPr>
+        <p:spPr/>
         <p:txBody>
           <a:bodyPr/>
           <a:lstStyle/>
@@ -20513,7 +20491,7 @@
       </p:sp>
       <p:pic>
         <p:nvPicPr>
-          <p:cNvPr id="5" name="Picture 4" descr="A screenshot of a social media post&#13;&#10;&#13;&#10;Description automatically generated">
+          <p:cNvPr id="5" name="Picture 4" descr="A screenshot of a social media post&#10;&#10;Description automatically generated">
             <a:extLst>
               <a:ext uri="{FF2B5EF4-FFF2-40B4-BE49-F238E27FC236}">
                 <a16:creationId xmlns:a16="http://schemas.microsoft.com/office/drawing/2014/main" id="{E3E1A0AC-3F72-584F-AAEB-D889A0D64A93}"/>
@@ -20620,12 +20598,7 @@
             <p:ph type="body" sz="quarter" idx="10"/>
           </p:nvPr>
         </p:nvSpPr>
-        <p:spPr>
-          <a:xfrm>
-            <a:off x="274638" y="1212850"/>
-            <a:ext cx="11887200" cy="683264"/>
-          </a:xfrm>
-        </p:spPr>
+        <p:spPr/>
         <p:txBody>
           <a:bodyPr/>
           <a:lstStyle/>
@@ -20667,7 +20640,7 @@
       </p:sp>
       <p:pic>
         <p:nvPicPr>
-          <p:cNvPr id="5" name="Picture 4" descr="A screenshot of a cell phone&#13;&#10;&#13;&#10;Description automatically generated">
+          <p:cNvPr id="5" name="Picture 4" descr="A screenshot of a cell phone&#10;&#10;Description automatically generated">
             <a:extLst>
               <a:ext uri="{FF2B5EF4-FFF2-40B4-BE49-F238E27FC236}">
                 <a16:creationId xmlns:a16="http://schemas.microsoft.com/office/drawing/2014/main" id="{EDD5E3D0-36C1-194E-A94B-032FF485A45F}"/>
@@ -20774,12 +20747,7 @@
             <p:ph type="body" sz="quarter" idx="10"/>
           </p:nvPr>
         </p:nvSpPr>
-        <p:spPr>
-          <a:xfrm>
-            <a:off x="274638" y="1212850"/>
-            <a:ext cx="11887200" cy="683264"/>
-          </a:xfrm>
-        </p:spPr>
+        <p:spPr/>
         <p:txBody>
           <a:bodyPr/>
           <a:lstStyle/>
@@ -20894,8 +20862,8 @@
         </p:nvSpPr>
         <p:spPr>
           <a:xfrm>
-            <a:off x="274638" y="1212850"/>
-            <a:ext cx="11887200" cy="5441490"/>
+            <a:off x="464400" y="1212850"/>
+            <a:ext cx="11574000" cy="4025717"/>
           </a:xfrm>
         </p:spPr>
         <p:txBody>
@@ -20903,74 +20871,162 @@
           <a:lstStyle/>
           <a:p>
             <a:r>
-              <a:rPr lang="en-US" sz="2800" dirty="0"/>
+              <a:rPr lang="en-US" dirty="0">
+                <a:solidFill>
+                  <a:schemeClr val="accent1"/>
+                </a:solidFill>
+              </a:rPr>
               <a:t>.</a:t>
             </a:r>
             <a:r>
-              <a:rPr lang="en-US" sz="2800" dirty="0" err="1"/>
+              <a:rPr lang="en-US" dirty="0" err="1">
+                <a:solidFill>
+                  <a:schemeClr val="accent1"/>
+                </a:solidFill>
+              </a:rPr>
               <a:t>vscode</a:t>
             </a:r>
             <a:r>
-              <a:rPr lang="en-US" sz="2800" dirty="0"/>
-              <a:t>: includes Visual Studio Code integration files</a:t>
-            </a:r>
-          </a:p>
-          <a:p>
-            <a:r>
-              <a:rPr lang="en-US" sz="2800" dirty="0"/>
-              <a:t>config: includes all config files</a:t>
-            </a:r>
-          </a:p>
-          <a:p>
-            <a:r>
-              <a:rPr lang="en-US" sz="2800" dirty="0" err="1"/>
+              <a:rPr lang="en-US" dirty="0">
+                <a:solidFill>
+                  <a:schemeClr val="accent1"/>
+                </a:solidFill>
+              </a:rPr>
+              <a:t>:</a:t>
+            </a:r>
+            <a:r>
+              <a:rPr lang="en-US" dirty="0"/>
+              <a:t> includes Visual Studio Code integration files</a:t>
+            </a:r>
+          </a:p>
+          <a:p>
+            <a:r>
+              <a:rPr lang="en-US" dirty="0">
+                <a:solidFill>
+                  <a:schemeClr val="accent1"/>
+                </a:solidFill>
+              </a:rPr>
+              <a:t>config:</a:t>
+            </a:r>
+            <a:r>
+              <a:rPr lang="en-US" dirty="0"/>
+              <a:t> includes all config files</a:t>
+            </a:r>
+          </a:p>
+          <a:p>
+            <a:r>
+              <a:rPr lang="en-US" dirty="0" err="1">
+                <a:solidFill>
+                  <a:schemeClr val="accent1"/>
+                </a:solidFill>
+              </a:rPr>
               <a:t>dist</a:t>
             </a:r>
             <a:r>
-              <a:rPr lang="en-US" sz="2800" dirty="0"/>
-              <a:t>: created automatically on builds – contains out from bundle process</a:t>
-            </a:r>
-          </a:p>
-          <a:p>
-            <a:r>
-              <a:rPr lang="en-US" sz="2800" dirty="0"/>
-              <a:t>lib: created automatically on builds – contains pre-bundled built files</a:t>
-            </a:r>
-          </a:p>
-          <a:p>
-            <a:r>
-              <a:rPr lang="en-US" sz="2800" dirty="0" err="1"/>
+              <a:rPr lang="en-US" dirty="0">
+                <a:solidFill>
+                  <a:schemeClr val="accent1"/>
+                </a:solidFill>
+              </a:rPr>
+              <a:t>:</a:t>
+            </a:r>
+            <a:r>
+              <a:rPr lang="en-US" dirty="0"/>
+              <a:t> created automatically on builds – contains out from bundle process</a:t>
+            </a:r>
+          </a:p>
+          <a:p>
+            <a:r>
+              <a:rPr lang="en-US" dirty="0">
+                <a:solidFill>
+                  <a:schemeClr val="accent1"/>
+                </a:solidFill>
+              </a:rPr>
+              <a:t>lib:</a:t>
+            </a:r>
+            <a:r>
+              <a:rPr lang="en-US" dirty="0"/>
+              <a:t> created automatically on builds – contains pre-bundled built files</a:t>
+            </a:r>
+          </a:p>
+          <a:p>
+            <a:r>
+              <a:rPr lang="en-US" dirty="0" err="1">
+                <a:solidFill>
+                  <a:schemeClr val="accent1"/>
+                </a:solidFill>
+              </a:rPr>
               <a:t>node_modules</a:t>
             </a:r>
             <a:r>
-              <a:rPr lang="en-US" sz="2800" dirty="0"/>
-              <a:t>: created automatically when installing all package dependencies with a package manager</a:t>
-            </a:r>
-          </a:p>
-          <a:p>
-            <a:r>
-              <a:rPr lang="en-US" sz="2800" dirty="0" err="1"/>
+              <a:rPr lang="en-US" dirty="0">
+                <a:solidFill>
+                  <a:schemeClr val="accent1"/>
+                </a:solidFill>
+              </a:rPr>
+              <a:t>:</a:t>
+            </a:r>
+            <a:r>
+              <a:rPr lang="en-US" dirty="0"/>
+              <a:t> created automatically when installing all package dependencies with a package manager</a:t>
+            </a:r>
+          </a:p>
+          <a:p>
+            <a:r>
+              <a:rPr lang="en-US" dirty="0" err="1">
+                <a:solidFill>
+                  <a:schemeClr val="accent1"/>
+                </a:solidFill>
+              </a:rPr>
               <a:t>sharepoint</a:t>
             </a:r>
             <a:r>
-              <a:rPr lang="en-US" sz="2800" dirty="0"/>
-              <a:t>: contains assets needed for deployment</a:t>
-            </a:r>
-          </a:p>
-          <a:p>
-            <a:r>
-              <a:rPr lang="en-US" sz="2800" dirty="0" err="1"/>
+              <a:rPr lang="en-US" dirty="0">
+                <a:solidFill>
+                  <a:schemeClr val="accent1"/>
+                </a:solidFill>
+              </a:rPr>
+              <a:t>:</a:t>
+            </a:r>
+            <a:r>
+              <a:rPr lang="en-US" dirty="0"/>
+              <a:t> contains assets needed for deployment</a:t>
+            </a:r>
+          </a:p>
+          <a:p>
+            <a:r>
+              <a:rPr lang="en-US" dirty="0" err="1">
+                <a:solidFill>
+                  <a:schemeClr val="accent1"/>
+                </a:solidFill>
+              </a:rPr>
               <a:t>src</a:t>
             </a:r>
             <a:r>
-              <a:rPr lang="en-US" sz="2800" dirty="0"/>
-              <a:t>: this is the main folder of the project, it includes the extension, styles, and a test file</a:t>
-            </a:r>
-          </a:p>
-          <a:p>
-            <a:r>
-              <a:rPr lang="en-US" sz="2800" dirty="0"/>
-              <a:t>temp: created automatically on builds - contains local dev webserver files</a:t>
+              <a:rPr lang="en-US" dirty="0">
+                <a:solidFill>
+                  <a:schemeClr val="accent1"/>
+                </a:solidFill>
+              </a:rPr>
+              <a:t>:</a:t>
+            </a:r>
+            <a:r>
+              <a:rPr lang="en-US" dirty="0"/>
+              <a:t> this is the main folder of the project, it includes the extension, styles, and a test file</a:t>
+            </a:r>
+          </a:p>
+          <a:p>
+            <a:r>
+              <a:rPr lang="en-US" dirty="0">
+                <a:solidFill>
+                  <a:schemeClr val="accent1"/>
+                </a:solidFill>
+              </a:rPr>
+              <a:t>temp:</a:t>
+            </a:r>
+            <a:r>
+              <a:rPr lang="en-US" dirty="0"/>
+              <a:t> created automatically on builds - contains local dev webserver files</a:t>
             </a:r>
           </a:p>
         </p:txBody>
@@ -21001,7 +21057,7 @@
     </p:spTree>
     <p:extLst>
       <p:ext uri="{BB962C8B-B14F-4D97-AF65-F5344CB8AC3E}">
-        <p14:creationId xmlns:p14="http://schemas.microsoft.com/office/powerpoint/2010/main" val="616216480"/>
+        <p14:creationId xmlns:p14="http://schemas.microsoft.com/office/powerpoint/2010/main" val="580721042"/>
       </p:ext>
     </p:extLst>
   </p:cSld>
@@ -21047,12 +21103,7 @@
             <p:ph type="body" sz="quarter" idx="10"/>
           </p:nvPr>
         </p:nvSpPr>
-        <p:spPr>
-          <a:xfrm>
-            <a:off x="274638" y="1212850"/>
-            <a:ext cx="11887200" cy="5367623"/>
-          </a:xfrm>
-        </p:spPr>
+        <p:spPr/>
         <p:txBody>
           <a:bodyPr/>
           <a:lstStyle/>
@@ -21201,8 +21252,8 @@
         </p:nvSpPr>
         <p:spPr>
           <a:xfrm>
-            <a:off x="274638" y="1212850"/>
-            <a:ext cx="11887200" cy="5269135"/>
+            <a:off x="464400" y="1212850"/>
+            <a:ext cx="11574000" cy="2853089"/>
           </a:xfrm>
         </p:spPr>
         <p:txBody>

</xml_diff>

<commit_message>
Fix link in app customizer slide deck
</commit_message>
<xml_diff>
--- a/01 into+appcustomizer.pptx
+++ b/01 into+appcustomizer.pptx
@@ -1172,8 +1172,8 @@
     <dgm:cxn modelId="{1A54CE04-8A96-4E4A-89DB-FB2A1A17744F}" type="presOf" srcId="{7FD8A240-07A6-F345-A4B5-9AFD7D04E09E}" destId="{8C7BF5B7-4285-C94D-AA34-B3807C7E91FB}" srcOrd="0" destOrd="0" presId="urn:microsoft.com/office/officeart/2005/8/layout/vList2"/>
     <dgm:cxn modelId="{63C3212D-1DCF-8044-A3CF-E372F4EA8362}" srcId="{0FC085B4-97CE-2149-B002-3BE96E991E3C}" destId="{11DE7530-2214-3A46-9779-D26EBB89B8D8}" srcOrd="1" destOrd="0" parTransId="{3BEBEC14-E9DD-5C4A-9EAF-10414B491D11}" sibTransId="{92A6A7B2-A1F5-D54F-B97F-04866B340CB4}"/>
     <dgm:cxn modelId="{97FF1C33-165D-9744-B9DD-5FD72C89A0A7}" type="presOf" srcId="{1680333F-291D-CB49-8833-C083699793E0}" destId="{B0272B02-624D-2445-B63B-A4B45C1ED737}" srcOrd="0" destOrd="0" presId="urn:microsoft.com/office/officeart/2005/8/layout/vList2"/>
+    <dgm:cxn modelId="{FBA34671-A6B0-B74F-B2B2-C18DD774C1FA}" type="presOf" srcId="{11DE7530-2214-3A46-9779-D26EBB89B8D8}" destId="{2FB78BDF-7C8F-1F41-8CD6-4B786B18D9FD}" srcOrd="0" destOrd="0" presId="urn:microsoft.com/office/officeart/2005/8/layout/vList2"/>
     <dgm:cxn modelId="{25C03C5A-4ECE-A34E-96BF-DE75E1E0F7EB}" type="presOf" srcId="{0FC085B4-97CE-2149-B002-3BE96E991E3C}" destId="{70B8A340-42D2-FA49-B0EC-FAFE4652EAD9}" srcOrd="0" destOrd="0" presId="urn:microsoft.com/office/officeart/2005/8/layout/vList2"/>
-    <dgm:cxn modelId="{FBA34671-A6B0-B74F-B2B2-C18DD774C1FA}" type="presOf" srcId="{11DE7530-2214-3A46-9779-D26EBB89B8D8}" destId="{2FB78BDF-7C8F-1F41-8CD6-4B786B18D9FD}" srcOrd="0" destOrd="0" presId="urn:microsoft.com/office/officeart/2005/8/layout/vList2"/>
     <dgm:cxn modelId="{96B4197D-2080-E246-BEDB-AC65A9B0EC38}" srcId="{0FC085B4-97CE-2149-B002-3BE96E991E3C}" destId="{A8E42F35-E34E-9E4B-A895-3BC748187CD3}" srcOrd="3" destOrd="0" parTransId="{8D054F3E-704E-1F47-866C-CB97D4DF2B6E}" sibTransId="{976463D6-3DF4-D14D-BDED-C1EC5A591A19}"/>
     <dgm:cxn modelId="{DD996A87-FB18-2B4E-B34F-9E0235E9B363}" srcId="{0FC085B4-97CE-2149-B002-3BE96E991E3C}" destId="{7FD8A240-07A6-F345-A4B5-9AFD7D04E09E}" srcOrd="0" destOrd="0" parTransId="{028B14B4-179B-914A-A696-BC38CCE94176}" sibTransId="{3862C498-2BCA-314C-82B5-D7FF7FA6942A}"/>
     <dgm:cxn modelId="{78A0C8DA-8CE3-C440-99CD-A857846AFA85}" type="presOf" srcId="{A8E42F35-E34E-9E4B-A895-3BC748187CD3}" destId="{E4AF1CAC-D73A-A24F-9293-09183EA92B01}" srcOrd="0" destOrd="0" presId="urn:microsoft.com/office/officeart/2005/8/layout/vList2"/>
@@ -2806,7 +2806,7 @@
               <a:rPr lang="en-US" smtClean="0">
                 <a:latin typeface="Segoe UI" pitchFamily="34" charset="0"/>
               </a:rPr>
-              <a:t>1/7/19 3:30 PM</a:t>
+              <a:t>3/3/2019 9:36 AM</a:t>
             </a:fld>
             <a:endParaRPr lang="en-US" dirty="0">
               <a:latin typeface="Segoe UI" pitchFamily="34" charset="0"/>
@@ -3103,7 +3103,7 @@
           <a:p>
             <a:fld id="{D18B56EA-E28F-4F92-9F16-7A6F2501B303}" type="datetime8">
               <a:rPr lang="en-US" smtClean="0"/>
-              <a:t>1/7/19 3:24 PM</a:t>
+              <a:t>3/3/2019 9:36 AM</a:t>
             </a:fld>
             <a:endParaRPr lang="en-US" dirty="0"/>
           </a:p>
@@ -3486,7 +3486,7 @@
           <a:p>
             <a:fld id="{D18B56EA-E28F-4F92-9F16-7A6F2501B303}" type="datetime8">
               <a:rPr lang="en-US" smtClean="0"/>
-              <a:t>1/7/19 3:24 PM</a:t>
+              <a:t>3/3/2019 9:36 AM</a:t>
             </a:fld>
             <a:endParaRPr lang="en-US" dirty="0"/>
           </a:p>
@@ -3667,7 +3667,7 @@
           <a:p>
             <a:fld id="{D18B56EA-E28F-4F92-9F16-7A6F2501B303}" type="datetime8">
               <a:rPr lang="en-US" smtClean="0"/>
-              <a:t>1/7/19 3:24 PM</a:t>
+              <a:t>3/3/2019 9:36 AM</a:t>
             </a:fld>
             <a:endParaRPr lang="en-US" dirty="0"/>
           </a:p>
@@ -4010,7 +4010,7 @@
           <a:p>
             <a:fld id="{D18B56EA-E28F-4F92-9F16-7A6F2501B303}" type="datetime8">
               <a:rPr lang="en-US" smtClean="0"/>
-              <a:t>1/7/19 3:30 PM</a:t>
+              <a:t>3/3/2019 9:36 AM</a:t>
             </a:fld>
             <a:endParaRPr lang="en-US" dirty="0"/>
           </a:p>
@@ -4191,7 +4191,7 @@
           <a:p>
             <a:fld id="{D18B56EA-E28F-4F92-9F16-7A6F2501B303}" type="datetime8">
               <a:rPr lang="en-US" smtClean="0"/>
-              <a:t>1/7/19 3:30 PM</a:t>
+              <a:t>3/3/2019 9:36 AM</a:t>
             </a:fld>
             <a:endParaRPr lang="en-US" dirty="0"/>
           </a:p>
@@ -4372,7 +4372,7 @@
           <a:p>
             <a:fld id="{D18B56EA-E28F-4F92-9F16-7A6F2501B303}" type="datetime8">
               <a:rPr lang="en-US" smtClean="0"/>
-              <a:t>1/7/19 3:30 PM</a:t>
+              <a:t>3/3/2019 9:36 AM</a:t>
             </a:fld>
             <a:endParaRPr lang="en-US" dirty="0"/>
           </a:p>
@@ -4553,7 +4553,7 @@
           <a:p>
             <a:fld id="{D18B56EA-E28F-4F92-9F16-7A6F2501B303}" type="datetime8">
               <a:rPr lang="en-US" smtClean="0"/>
-              <a:t>1/7/19 3:30 PM</a:t>
+              <a:t>3/3/2019 9:36 AM</a:t>
             </a:fld>
             <a:endParaRPr lang="en-US" dirty="0"/>
           </a:p>
@@ -19696,7 +19696,7 @@
               <a:rPr lang="en-US" sz="1800" dirty="0">
                 <a:latin typeface="+mj-lt"/>
               </a:rPr>
-              <a:t>SharePoint Framework</a:t>
+              <a:t>Overview of the SharePoint Framework</a:t>
             </a:r>
           </a:p>
           <a:p>
@@ -19715,7 +19715,7 @@
                 <a:latin typeface="+mj-lt"/>
                 <a:hlinkClick r:id="rId3"/>
               </a:rPr>
-              <a:t>https://docs.microsoft.com/sharepoint/dev/spfx</a:t>
+              <a:t>https://docs.microsoft.com/sharepoint/dev/spfx/sharepoint-framework-overview</a:t>
             </a:r>
             <a:endParaRPr lang="en-US" sz="1800" dirty="0">
               <a:latin typeface="+mj-lt"/>

</xml_diff>

<commit_message>
Update Ex 1 slide deck
</commit_message>
<xml_diff>
--- a/01 into+appcustomizer.pptx
+++ b/01 into+appcustomizer.pptx
@@ -2806,7 +2806,7 @@
               <a:rPr lang="en-US" smtClean="0">
                 <a:latin typeface="Segoe UI" pitchFamily="34" charset="0"/>
               </a:rPr>
-              <a:t>3/3/2019 9:36 AM</a:t>
+              <a:t>8/31/2019 2:44 PM</a:t>
             </a:fld>
             <a:endParaRPr lang="en-US" dirty="0">
               <a:latin typeface="Segoe UI" pitchFamily="34" charset="0"/>
@@ -3103,7 +3103,7 @@
           <a:p>
             <a:fld id="{D18B56EA-E28F-4F92-9F16-7A6F2501B303}" type="datetime8">
               <a:rPr lang="en-US" smtClean="0"/>
-              <a:t>3/3/2019 9:36 AM</a:t>
+              <a:t>8/31/2019 2:44 PM</a:t>
             </a:fld>
             <a:endParaRPr lang="en-US" dirty="0"/>
           </a:p>
@@ -3486,7 +3486,7 @@
           <a:p>
             <a:fld id="{D18B56EA-E28F-4F92-9F16-7A6F2501B303}" type="datetime8">
               <a:rPr lang="en-US" smtClean="0"/>
-              <a:t>3/3/2019 9:36 AM</a:t>
+              <a:t>8/31/2019 2:44 PM</a:t>
             </a:fld>
             <a:endParaRPr lang="en-US" dirty="0"/>
           </a:p>
@@ -3667,7 +3667,7 @@
           <a:p>
             <a:fld id="{D18B56EA-E28F-4F92-9F16-7A6F2501B303}" type="datetime8">
               <a:rPr lang="en-US" smtClean="0"/>
-              <a:t>3/3/2019 9:36 AM</a:t>
+              <a:t>8/31/2019 2:44 PM</a:t>
             </a:fld>
             <a:endParaRPr lang="en-US" dirty="0"/>
           </a:p>
@@ -4010,7 +4010,7 @@
           <a:p>
             <a:fld id="{D18B56EA-E28F-4F92-9F16-7A6F2501B303}" type="datetime8">
               <a:rPr lang="en-US" smtClean="0"/>
-              <a:t>3/3/2019 9:36 AM</a:t>
+              <a:t>8/31/2019 2:44 PM</a:t>
             </a:fld>
             <a:endParaRPr lang="en-US" dirty="0"/>
           </a:p>
@@ -4191,7 +4191,7 @@
           <a:p>
             <a:fld id="{D18B56EA-E28F-4F92-9F16-7A6F2501B303}" type="datetime8">
               <a:rPr lang="en-US" smtClean="0"/>
-              <a:t>3/3/2019 9:36 AM</a:t>
+              <a:t>8/31/2019 2:44 PM</a:t>
             </a:fld>
             <a:endParaRPr lang="en-US" dirty="0"/>
           </a:p>
@@ -4372,7 +4372,7 @@
           <a:p>
             <a:fld id="{D18B56EA-E28F-4F92-9F16-7A6F2501B303}" type="datetime8">
               <a:rPr lang="en-US" smtClean="0"/>
-              <a:t>3/3/2019 9:36 AM</a:t>
+              <a:t>8/31/2019 2:44 PM</a:t>
             </a:fld>
             <a:endParaRPr lang="en-US" dirty="0"/>
           </a:p>
@@ -4553,7 +4553,7 @@
           <a:p>
             <a:fld id="{D18B56EA-E28F-4F92-9F16-7A6F2501B303}" type="datetime8">
               <a:rPr lang="en-US" smtClean="0"/>
-              <a:t>3/3/2019 9:36 AM</a:t>
+              <a:t>8/31/2019 2:44 PM</a:t>
             </a:fld>
             <a:endParaRPr lang="en-US" dirty="0"/>
           </a:p>
@@ -18535,10 +18535,10 @@
       </p:sp>
       <p:pic>
         <p:nvPicPr>
-          <p:cNvPr id="4" name="Picture 3" descr="A screenshot of a social media post&#10;&#10;Description automatically generated">
+          <p:cNvPr id="6" name="Picture 5">
             <a:extLst>
               <a:ext uri="{FF2B5EF4-FFF2-40B4-BE49-F238E27FC236}">
-                <a16:creationId xmlns:a16="http://schemas.microsoft.com/office/drawing/2014/main" id="{F9F56E18-9972-E341-B291-0A2B8AA51815}"/>
+                <a16:creationId xmlns:a16="http://schemas.microsoft.com/office/drawing/2014/main" id="{12C721E8-928E-4779-95EF-BDB6E328165C}"/>
               </a:ext>
             </a:extLst>
           </p:cNvPr>
@@ -18555,42 +18555,12 @@
         </p:blipFill>
         <p:spPr>
           <a:xfrm>
-            <a:off x="5606266" y="1886465"/>
-            <a:ext cx="5700511" cy="4284885"/>
+            <a:off x="4968590" y="2370840"/>
+            <a:ext cx="7003485" cy="3688503"/>
           </a:xfrm>
           <a:prstGeom prst="rect">
             <a:avLst/>
           </a:prstGeom>
-          <a:solidFill>
-            <a:srgbClr val="FFFFFF">
-              <a:shade val="85000"/>
-            </a:srgbClr>
-          </a:solidFill>
-          <a:ln w="88900" cap="sq">
-            <a:solidFill>
-              <a:srgbClr val="FFFFFF"/>
-            </a:solidFill>
-            <a:miter lim="800000"/>
-          </a:ln>
-          <a:effectLst>
-            <a:outerShdw blurRad="55000" dist="18000" dir="5400000" algn="tl" rotWithShape="0">
-              <a:srgbClr val="000000">
-                <a:alpha val="40000"/>
-              </a:srgbClr>
-            </a:outerShdw>
-          </a:effectLst>
-          <a:scene3d>
-            <a:camera prst="orthographicFront"/>
-            <a:lightRig rig="twoPt" dir="t">
-              <a:rot lat="0" lon="0" rev="7200000"/>
-            </a:lightRig>
-          </a:scene3d>
-          <a:sp3d>
-            <a:bevelT w="25400" h="19050"/>
-            <a:contourClr>
-              <a:srgbClr val="FFFFFF"/>
-            </a:contourClr>
-          </a:sp3d>
         </p:spPr>
       </p:pic>
     </p:spTree>
@@ -20542,10 +20512,10 @@
       </p:sp>
       <p:pic>
         <p:nvPicPr>
-          <p:cNvPr id="5" name="Picture 4" descr="A screenshot of a social media post&#10;&#10;Description automatically generated">
+          <p:cNvPr id="6" name="Picture 5">
             <a:extLst>
               <a:ext uri="{FF2B5EF4-FFF2-40B4-BE49-F238E27FC236}">
-                <a16:creationId xmlns:a16="http://schemas.microsoft.com/office/drawing/2014/main" id="{E3E1A0AC-3F72-584F-AAEB-D889A0D64A93}"/>
+                <a16:creationId xmlns:a16="http://schemas.microsoft.com/office/drawing/2014/main" id="{89397146-700A-40D8-8F8F-B3D2F43F3427}"/>
               </a:ext>
             </a:extLst>
           </p:cNvPr>
@@ -20562,42 +20532,12 @@
         </p:blipFill>
         <p:spPr>
           <a:xfrm>
-            <a:off x="3291102" y="2132774"/>
-            <a:ext cx="5854270" cy="4400460"/>
+            <a:off x="2175617" y="2102698"/>
+            <a:ext cx="8085240" cy="4258227"/>
           </a:xfrm>
           <a:prstGeom prst="rect">
             <a:avLst/>
           </a:prstGeom>
-          <a:solidFill>
-            <a:srgbClr val="FFFFFF">
-              <a:shade val="85000"/>
-            </a:srgbClr>
-          </a:solidFill>
-          <a:ln w="88900" cap="sq">
-            <a:solidFill>
-              <a:srgbClr val="FFFFFF"/>
-            </a:solidFill>
-            <a:miter lim="800000"/>
-          </a:ln>
-          <a:effectLst>
-            <a:outerShdw blurRad="55000" dist="18000" dir="5400000" algn="tl" rotWithShape="0">
-              <a:srgbClr val="000000">
-                <a:alpha val="40000"/>
-              </a:srgbClr>
-            </a:outerShdw>
-          </a:effectLst>
-          <a:scene3d>
-            <a:camera prst="orthographicFront"/>
-            <a:lightRig rig="twoPt" dir="t">
-              <a:rot lat="0" lon="0" rev="7200000"/>
-            </a:lightRig>
-          </a:scene3d>
-          <a:sp3d>
-            <a:bevelT w="25400" h="19050"/>
-            <a:contourClr>
-              <a:srgbClr val="FFFFFF"/>
-            </a:contourClr>
-          </a:sp3d>
         </p:spPr>
       </p:pic>
     </p:spTree>

</xml_diff>